<commit_message>
GDD asset manager tarafından güncellendi
 Woods için sağlık mekaniği iptal, Woods aynen Fletcher gibi her şeyden tek yiyip ölecek. Woods'un dinamit atağının mekanikleri henüz düşünülüp dokümana eklenmedi.
</commit_message>
<xml_diff>
--- a/Dökümanlar/Zombi Slayers 14.03.2025.pptx
+++ b/Dökümanlar/Zombi Slayers 14.03.2025.pptx
@@ -12,7 +12,6 @@
     <p:sldId id="261" r:id="rId6"/>
     <p:sldId id="262" r:id="rId7"/>
     <p:sldId id="263" r:id="rId8"/>
-    <p:sldId id="259" r:id="rId9"/>
   </p:sldIdLst>
   <p:sldSz cx="12192000" cy="6858000"/>
   <p:notesSz cx="6858000" cy="9144000"/>
@@ -111,6 +110,11 @@
       </a:defRPr>
     </a:lvl9pPr>
   </p:defaultTextStyle>
+  <p:extLst>
+    <p:ext uri="{EFAFB233-063F-42B5-8137-9DF3F51BA10A}">
+      <p15:sldGuideLst xmlns:p15="http://schemas.microsoft.com/office/powerpoint/2012/main"/>
+    </p:ext>
+  </p:extLst>
 </p:presentation>
 </file>
 
@@ -3470,17 +3474,25 @@
           <a:p>
             <a:r>
               <a:rPr lang="tr-TR" dirty="0"/>
-              <a:t>İnşaat</a:t>
-            </a:r>
-          </a:p>
-          <a:p>
-            <a:r>
-              <a:rPr lang="tr-TR" dirty="0" err="1"/>
-              <a:t>Mutantlı</a:t>
-            </a:r>
-            <a:r>
-              <a:rPr lang="tr-TR" dirty="0"/>
-              <a:t> bir şeydi, adını unuttum. Sağlığa zararlı falan</a:t>
+              <a:t>İnşaat Sahası – bölüm 1 burası, alttaki mekanlardan sadece biri seçilip bölüm 1 bittikten sonra bölüm 2 yapılacak:</a:t>
+            </a:r>
+          </a:p>
+          <a:p>
+            <a:r>
+              <a:rPr lang="tr-TR" dirty="0"/>
+              <a:t>Nükleer Reaktör</a:t>
+            </a:r>
+          </a:p>
+          <a:p>
+            <a:r>
+              <a:rPr lang="tr-TR" dirty="0"/>
+              <a:t>Çimento Fabrikası</a:t>
+            </a:r>
+          </a:p>
+          <a:p>
+            <a:r>
+              <a:rPr lang="tr-TR" dirty="0"/>
+              <a:t>Konteyner Deposu</a:t>
             </a:r>
           </a:p>
         </p:txBody>
@@ -3578,7 +3590,7 @@
             </a:r>
             <a:r>
               <a:rPr lang="tr-TR" dirty="0"/>
-              <a:t> ve düz vuruşu bazı mekanlar ile düşman mermilerini patlatabiliyor</a:t>
+              <a:t> ve düz vuruşu bazı mekanlar ile düşman mermilerini kırabiliyor</a:t>
             </a:r>
           </a:p>
           <a:p>
@@ -3613,18 +3625,22 @@
             <a:pPr lvl="2"/>
             <a:r>
               <a:rPr lang="tr-TR" dirty="0"/>
-              <a:t>Zombilere 2 atıyor ama hızlı vuruyor ama şarjörünü değiştirmesi uzun sürüyor</a:t>
+              <a:t>Zombilere 2 atıyor ama hızlı vuruyor ve şarjörünü değiştirmesi uzun sürüyor</a:t>
             </a:r>
           </a:p>
           <a:p>
             <a:pPr lvl="1"/>
             <a:r>
+              <a:rPr lang="tr-TR" dirty="0"/>
+              <a:t>Bazı engelleri aşmak ve her zombi atağından kaçmak için yerde kayabiliyor (</a:t>
+            </a:r>
+            <a:r>
               <a:rPr lang="tr-TR" dirty="0" err="1"/>
-              <a:t>Slide</a:t>
-            </a:r>
-            <a:r>
-              <a:rPr lang="tr-TR" dirty="0"/>
-              <a:t> atabiliyor</a:t>
+              <a:t>slide</a:t>
+            </a:r>
+            <a:r>
+              <a:rPr lang="tr-TR" dirty="0"/>
+              <a:t>)</a:t>
             </a:r>
           </a:p>
         </p:txBody>
@@ -3711,32 +3727,17 @@
           <a:lstStyle/>
           <a:p>
             <a:r>
+              <a:rPr lang="tr-TR" dirty="0"/>
+              <a:t>Oyuncular engel veya barikatlara çarparsa ölür, bir </a:t>
+            </a:r>
+            <a:r>
               <a:rPr lang="tr-TR" dirty="0" err="1"/>
-              <a:t>Woods</a:t>
-            </a:r>
-            <a:r>
-              <a:rPr lang="tr-TR" dirty="0"/>
-              <a:t> çarparsa yarı can </a:t>
-            </a:r>
-            <a:r>
-              <a:rPr lang="tr-TR" dirty="0" err="1"/>
-              <a:t>yicek</a:t>
-            </a:r>
-            <a:endParaRPr lang="tr-TR" dirty="0"/>
-          </a:p>
-          <a:p>
-            <a:r>
-              <a:rPr lang="tr-TR" dirty="0"/>
-              <a:t>Fletcher çarparsa tek </a:t>
-            </a:r>
-            <a:r>
-              <a:rPr lang="tr-TR" dirty="0" err="1"/>
-              <a:t>yicek</a:t>
-            </a:r>
-            <a:endParaRPr lang="tr-TR" dirty="0"/>
-          </a:p>
-          <a:p>
-            <a:endParaRPr lang="tr-TR" dirty="0"/>
+              <a:t>med</a:t>
+            </a:r>
+            <a:r>
+              <a:rPr lang="tr-TR" dirty="0"/>
+              <a:t> kit kaybederler.</a:t>
+            </a:r>
           </a:p>
           <a:p>
             <a:r>
@@ -3869,7 +3870,7 @@
           <a:p>
             <a:r>
               <a:rPr lang="tr-TR" dirty="0"/>
-              <a:t>Düşmanlar «Normal Zombi»</a:t>
+              <a:t>Düşmanlar «Sıradan Zombi»</a:t>
             </a:r>
           </a:p>
         </p:txBody>
@@ -3897,7 +3898,15 @@
           <a:p>
             <a:r>
               <a:rPr lang="tr-TR" dirty="0"/>
-              <a:t>Oyuncu ile aynı kattaysa üzerine koşup onu yaralamaya çalışacak</a:t>
+              <a:t>Oyuncu ile aynı kattaysa üzerine koşup yeterince yaklaştığında oyuncuya tırmalama atağı yapacak. Vurursa oyuncu ölür, bir </a:t>
+            </a:r>
+            <a:r>
+              <a:rPr lang="tr-TR" dirty="0" err="1"/>
+              <a:t>med</a:t>
+            </a:r>
+            <a:r>
+              <a:rPr lang="tr-TR" dirty="0"/>
+              <a:t> kit kaybeder.</a:t>
             </a:r>
           </a:p>
         </p:txBody>
@@ -3983,7 +3992,13 @@
           <a:p>
             <a:r>
               <a:rPr lang="tr-TR" dirty="0"/>
-              <a:t>Oyuncu ile aynı kattaysa asit tükürecek</a:t>
+              <a:t>Oyuncu ile aynı kattaysa asit tükürecek.</a:t>
+            </a:r>
+          </a:p>
+          <a:p>
+            <a:r>
+              <a:rPr lang="tr-TR" dirty="0"/>
+              <a:t>Hep sabit duracak.</a:t>
             </a:r>
           </a:p>
           <a:p>
@@ -4011,7 +4026,7 @@
             </a:r>
             <a:r>
               <a:rPr lang="tr-TR" dirty="0"/>
-              <a:t> düz vuruşuyla yok olacak</a:t>
+              <a:t> sıradan atağı ile yok olacak</a:t>
             </a:r>
           </a:p>
           <a:p>
@@ -4024,24 +4039,16 @@
           <a:p>
             <a:pPr lvl="2"/>
             <a:r>
+              <a:rPr lang="tr-TR" dirty="0"/>
+              <a:t>Oyuncu ölecek ve bir </a:t>
+            </a:r>
+            <a:r>
               <a:rPr lang="tr-TR" dirty="0" err="1"/>
-              <a:t>Woods</a:t>
-            </a:r>
-            <a:r>
-              <a:rPr lang="tr-TR" dirty="0"/>
-              <a:t> yarı can </a:t>
-            </a:r>
-            <a:r>
-              <a:rPr lang="tr-TR" dirty="0" err="1"/>
-              <a:t>yicek</a:t>
-            </a:r>
-            <a:endParaRPr lang="tr-TR" dirty="0"/>
-          </a:p>
-          <a:p>
-            <a:pPr lvl="2"/>
-            <a:r>
-              <a:rPr lang="tr-TR" dirty="0"/>
-              <a:t>Fletcher ölecek (?)</a:t>
+              <a:t>med</a:t>
+            </a:r>
+            <a:r>
+              <a:rPr lang="tr-TR" dirty="0"/>
+              <a:t> kit kaybedecek.</a:t>
             </a:r>
           </a:p>
         </p:txBody>
@@ -4099,57 +4106,65 @@
           <a:p>
             <a:r>
               <a:rPr lang="tr-TR" dirty="0"/>
-              <a:t>Düşmanlar «</a:t>
+              <a:t>Düşmanlar «Kaslı Zombi»</a:t>
+            </a:r>
+          </a:p>
+        </p:txBody>
+      </p:sp>
+      <p:sp>
+        <p:nvSpPr>
+          <p:cNvPr id="3" name="İçerik Yer Tutucusu 2">
+            <a:extLst>
+              <a:ext uri="{FF2B5EF4-FFF2-40B4-BE49-F238E27FC236}">
+                <a16:creationId xmlns:a16="http://schemas.microsoft.com/office/drawing/2014/main" id="{71F77C68-CCC1-FA20-1479-58FE3FEAA6FB}"/>
+              </a:ext>
+            </a:extLst>
+          </p:cNvPr>
+          <p:cNvSpPr>
+            <a:spLocks noGrp="1"/>
+          </p:cNvSpPr>
+          <p:nvPr>
+            <p:ph idx="1"/>
+          </p:nvPr>
+        </p:nvSpPr>
+        <p:spPr/>
+        <p:txBody>
+          <a:bodyPr/>
+          <a:lstStyle/>
+          <a:p>
+            <a:r>
+              <a:rPr lang="tr-TR" dirty="0"/>
+              <a:t>Normal zombi ile aynı çalışacak ancak arada bir durup et topu tükürecek ve de sıradan zombi gibi yeterince yaklaşınca tırmalayacak ve tırmalarsa oyuncu ölecek.</a:t>
+            </a:r>
+          </a:p>
+          <a:p>
+            <a:r>
+              <a:rPr lang="tr-TR" dirty="0"/>
+              <a:t>Tükürdüğü et topunu </a:t>
             </a:r>
             <a:r>
               <a:rPr lang="tr-TR" dirty="0" err="1"/>
-              <a:t>Cekıd</a:t>
-            </a:r>
-            <a:r>
-              <a:rPr lang="tr-TR" dirty="0"/>
-              <a:t> Zombi»</a:t>
-            </a:r>
-          </a:p>
-        </p:txBody>
-      </p:sp>
-      <p:sp>
-        <p:nvSpPr>
-          <p:cNvPr id="3" name="İçerik Yer Tutucusu 2">
-            <a:extLst>
-              <a:ext uri="{FF2B5EF4-FFF2-40B4-BE49-F238E27FC236}">
-                <a16:creationId xmlns:a16="http://schemas.microsoft.com/office/drawing/2014/main" id="{71F77C68-CCC1-FA20-1479-58FE3FEAA6FB}"/>
-              </a:ext>
-            </a:extLst>
-          </p:cNvPr>
-          <p:cNvSpPr>
-            <a:spLocks noGrp="1"/>
-          </p:cNvSpPr>
-          <p:nvPr>
-            <p:ph idx="1"/>
-          </p:nvPr>
-        </p:nvSpPr>
-        <p:spPr/>
-        <p:txBody>
-          <a:bodyPr/>
-          <a:lstStyle/>
-          <a:p>
-            <a:r>
-              <a:rPr lang="tr-TR" dirty="0"/>
-              <a:t>Uzaktan tükürüp yakına gelince pençe savuracak</a:t>
-            </a:r>
-          </a:p>
-          <a:p>
-            <a:r>
-              <a:rPr lang="tr-TR" dirty="0"/>
-              <a:t>Ama </a:t>
-            </a:r>
+              <a:t>Woods</a:t>
+            </a:r>
+            <a:r>
+              <a:rPr lang="tr-TR" dirty="0"/>
+              <a:t> sıradan atağı ile kırabilir.</a:t>
+            </a:r>
+          </a:p>
+          <a:p>
+            <a:r>
+              <a:rPr lang="tr-TR" dirty="0"/>
+              <a:t>Oyuncu et topu atağını yerse ölecek.</a:t>
+            </a:r>
+          </a:p>
+          <a:p>
             <a:r>
               <a:rPr lang="tr-TR" dirty="0" err="1"/>
-              <a:t>Woods’a</a:t>
-            </a:r>
-            <a:r>
-              <a:rPr lang="tr-TR" dirty="0"/>
-              <a:t> da tek atıyor</a:t>
+              <a:t>Hitbox’ı</a:t>
+            </a:r>
+            <a:r>
+              <a:rPr lang="tr-TR" dirty="0"/>
+              <a:t> obez zombi ile aynı.</a:t>
             </a:r>
           </a:p>
         </p:txBody>
@@ -4158,89 +4173,6 @@
     <p:extLst>
       <p:ext uri="{BB962C8B-B14F-4D97-AF65-F5344CB8AC3E}">
         <p14:creationId xmlns:p14="http://schemas.microsoft.com/office/powerpoint/2010/main" val="3183086146"/>
-      </p:ext>
-    </p:extLst>
-  </p:cSld>
-  <p:clrMapOvr>
-    <a:masterClrMapping/>
-  </p:clrMapOvr>
-</p:sld>
-</file>
-
-<file path=ppt/slides/slide8.xml><?xml version="1.0" encoding="utf-8"?>
-<p:sld xmlns:a="http://schemas.openxmlformats.org/drawingml/2006/main" xmlns:r="http://schemas.openxmlformats.org/officeDocument/2006/relationships" xmlns:p="http://schemas.openxmlformats.org/presentationml/2006/main">
-  <p:cSld>
-    <p:spTree>
-      <p:nvGrpSpPr>
-        <p:cNvPr id="1" name=""/>
-        <p:cNvGrpSpPr/>
-        <p:nvPr/>
-      </p:nvGrpSpPr>
-      <p:grpSpPr>
-        <a:xfrm>
-          <a:off x="0" y="0"/>
-          <a:ext cx="0" cy="0"/>
-          <a:chOff x="0" y="0"/>
-          <a:chExt cx="0" cy="0"/>
-        </a:xfrm>
-      </p:grpSpPr>
-      <p:sp>
-        <p:nvSpPr>
-          <p:cNvPr id="2" name="Başlık 1">
-            <a:extLst>
-              <a:ext uri="{FF2B5EF4-FFF2-40B4-BE49-F238E27FC236}">
-                <a16:creationId xmlns:a16="http://schemas.microsoft.com/office/drawing/2014/main" id="{30CDB32F-FC3B-7076-5640-4F1822E7E9EB}"/>
-              </a:ext>
-            </a:extLst>
-          </p:cNvPr>
-          <p:cNvSpPr>
-            <a:spLocks noGrp="1"/>
-          </p:cNvSpPr>
-          <p:nvPr>
-            <p:ph type="title"/>
-          </p:nvPr>
-        </p:nvSpPr>
-        <p:spPr/>
-        <p:txBody>
-          <a:bodyPr/>
-          <a:lstStyle/>
-          <a:p>
-            <a:r>
-              <a:rPr lang="tr-TR" dirty="0"/>
-              <a:t>Can sistemi</a:t>
-            </a:r>
-          </a:p>
-        </p:txBody>
-      </p:sp>
-      <p:sp>
-        <p:nvSpPr>
-          <p:cNvPr id="3" name="İçerik Yer Tutucusu 2">
-            <a:extLst>
-              <a:ext uri="{FF2B5EF4-FFF2-40B4-BE49-F238E27FC236}">
-                <a16:creationId xmlns:a16="http://schemas.microsoft.com/office/drawing/2014/main" id="{7306787E-9FFB-8CAF-2531-0EA7C9C72139}"/>
-              </a:ext>
-            </a:extLst>
-          </p:cNvPr>
-          <p:cNvSpPr>
-            <a:spLocks noGrp="1"/>
-          </p:cNvSpPr>
-          <p:nvPr>
-            <p:ph idx="1"/>
-          </p:nvPr>
-        </p:nvSpPr>
-        <p:spPr/>
-        <p:txBody>
-          <a:bodyPr/>
-          <a:lstStyle/>
-          <a:p>
-            <a:endParaRPr lang="tr-TR"/>
-          </a:p>
-        </p:txBody>
-      </p:sp>
-    </p:spTree>
-    <p:extLst>
-      <p:ext uri="{BB962C8B-B14F-4D97-AF65-F5344CB8AC3E}">
-        <p14:creationId xmlns:p14="http://schemas.microsoft.com/office/powerpoint/2010/main" val="68904404"/>
       </p:ext>
     </p:extLst>
   </p:cSld>

</xml_diff>